<commit_message>
Se suben ya completas las diapositivas del video y se hacen arreglos al formatos de menus y salidas por consola del programa
</commit_message>
<xml_diff>
--- a/Desafío I.pptx
+++ b/Desafío I.pptx
@@ -16,8 +16,6 @@
     <p:sldId id="261" r:id="rId12"/>
     <p:sldId id="262" r:id="rId13"/>
     <p:sldId id="263" r:id="rId14"/>
-    <p:sldId id="264" r:id="rId15"/>
-    <p:sldId id="265" r:id="rId16"/>
   </p:sldIdLst>
   <p:sldSz cy="5143500" cx="9144000"/>
   <p:notesSz cx="6858000" cy="9144000"/>
@@ -794,105 +792,6 @@
 </p:notes>
 </file>
 
-<file path=ppt/notesSlides/notesSlide10.xml><?xml version="1.0" encoding="utf-8"?>
-<p:notes xmlns:a="http://schemas.openxmlformats.org/drawingml/2006/main" xmlns:r="http://schemas.openxmlformats.org/officeDocument/2006/relationships" xmlns:mc="http://schemas.openxmlformats.org/markup-compatibility/2006" xmlns:mv="urn:schemas-microsoft-com:mac:vml" xmlns:p="http://schemas.openxmlformats.org/presentationml/2006/main" xmlns:c="http://schemas.openxmlformats.org/drawingml/2006/chart" xmlns:dgm="http://schemas.openxmlformats.org/drawingml/2006/diagram" xmlns:o="urn:schemas-microsoft-com:office:office" xmlns:v="urn:schemas-microsoft-com:vml" xmlns:pvml="urn:schemas-microsoft-com:office:powerpoint" xmlns:com="http://schemas.openxmlformats.org/drawingml/2006/compatibility" xmlns:p14="http://schemas.microsoft.com/office/powerpoint/2010/main" xmlns:p15="http://schemas.microsoft.com/office/powerpoint/2012/main" xmlns:ahyp="http://schemas.microsoft.com/office/drawing/2018/hyperlinkcolor" showMasterPhAnim="0" showMasterSp="0">
-  <p:cSld>
-    <p:spTree>
-      <p:nvGrpSpPr>
-        <p:cNvPr id="108" name="Shape 108"/>
-        <p:cNvGrpSpPr/>
-        <p:nvPr/>
-      </p:nvGrpSpPr>
-      <p:grpSpPr>
-        <a:xfrm>
-          <a:off x="0" y="0"/>
-          <a:ext cx="0" cy="0"/>
-          <a:chOff x="0" y="0"/>
-          <a:chExt cx="0" cy="0"/>
-        </a:xfrm>
-      </p:grpSpPr>
-      <p:sp>
-        <p:nvSpPr>
-          <p:cNvPr id="109" name="Google Shape;109;gc6f90357f_0_47:notes"/>
-          <p:cNvSpPr/>
-          <p:nvPr>
-            <p:ph idx="2" type="sldImg"/>
-          </p:nvPr>
-        </p:nvSpPr>
-        <p:spPr>
-          <a:xfrm>
-            <a:off x="381188" y="685800"/>
-            <a:ext cx="6096300" cy="3429000"/>
-          </a:xfrm>
-          <a:custGeom>
-            <a:rect b="b" l="l" r="r" t="t"/>
-            <a:pathLst>
-              <a:path extrusionOk="0" h="120000" w="120000">
-                <a:moveTo>
-                  <a:pt x="0" y="0"/>
-                </a:moveTo>
-                <a:lnTo>
-                  <a:pt x="120000" y="0"/>
-                </a:lnTo>
-                <a:lnTo>
-                  <a:pt x="120000" y="120000"/>
-                </a:lnTo>
-                <a:lnTo>
-                  <a:pt x="0" y="120000"/>
-                </a:lnTo>
-                <a:close/>
-              </a:path>
-            </a:pathLst>
-          </a:custGeom>
-        </p:spPr>
-      </p:sp>
-      <p:sp>
-        <p:nvSpPr>
-          <p:cNvPr id="110" name="Google Shape;110;gc6f90357f_0_47:notes"/>
-          <p:cNvSpPr txBox="1"/>
-          <p:nvPr>
-            <p:ph idx="1" type="body"/>
-          </p:nvPr>
-        </p:nvSpPr>
-        <p:spPr>
-          <a:xfrm>
-            <a:off x="685800" y="4343400"/>
-            <a:ext cx="5486400" cy="4114800"/>
-          </a:xfrm>
-          <a:prstGeom prst="rect">
-            <a:avLst/>
-          </a:prstGeom>
-        </p:spPr>
-        <p:txBody>
-          <a:bodyPr anchorCtr="0" anchor="t" bIns="91425" lIns="91425" spcFirstLastPara="1" rIns="91425" wrap="square" tIns="91425">
-            <a:noAutofit/>
-          </a:bodyPr>
-          <a:lstStyle/>
-          <a:p>
-            <a:pPr indent="0" lvl="0" marL="0" rtl="0" algn="l">
-              <a:spcBef>
-                <a:spcPts val="0"/>
-              </a:spcBef>
-              <a:spcAft>
-                <a:spcPts val="0"/>
-              </a:spcAft>
-              <a:buNone/>
-            </a:pPr>
-            <a:r>
-              <a:t/>
-            </a:r>
-            <a:endParaRPr/>
-          </a:p>
-        </p:txBody>
-      </p:sp>
-    </p:spTree>
-  </p:cSld>
-  <p:clrMapOvr>
-    <a:masterClrMapping/>
-  </p:clrMapOvr>
-</p:notes>
-</file>
-
 <file path=ppt/notesSlides/notesSlide2.xml><?xml version="1.0" encoding="utf-8"?>
 <p:notes xmlns:a="http://schemas.openxmlformats.org/drawingml/2006/main" xmlns:r="http://schemas.openxmlformats.org/officeDocument/2006/relationships" xmlns:mc="http://schemas.openxmlformats.org/markup-compatibility/2006" xmlns:mv="urn:schemas-microsoft-com:mac:vml" xmlns:p="http://schemas.openxmlformats.org/presentationml/2006/main" xmlns:c="http://schemas.openxmlformats.org/drawingml/2006/chart" xmlns:dgm="http://schemas.openxmlformats.org/drawingml/2006/diagram" xmlns:o="urn:schemas-microsoft-com:office:office" xmlns:v="urn:schemas-microsoft-com:vml" xmlns:pvml="urn:schemas-microsoft-com:office:powerpoint" xmlns:com="http://schemas.openxmlformats.org/drawingml/2006/compatibility" xmlns:p14="http://schemas.microsoft.com/office/powerpoint/2010/main" xmlns:p15="http://schemas.microsoft.com/office/powerpoint/2012/main" xmlns:ahyp="http://schemas.microsoft.com/office/drawing/2018/hyperlinkcolor" showMasterPhAnim="0" showMasterSp="0">
   <p:cSld>
@@ -1542,105 +1441,6 @@
       <p:sp>
         <p:nvSpPr>
           <p:cNvPr id="102" name="Google Shape;102;gc6f90357f_0_35:notes"/>
-          <p:cNvSpPr txBox="1"/>
-          <p:nvPr>
-            <p:ph idx="1" type="body"/>
-          </p:nvPr>
-        </p:nvSpPr>
-        <p:spPr>
-          <a:xfrm>
-            <a:off x="685800" y="4343400"/>
-            <a:ext cx="5486400" cy="4114800"/>
-          </a:xfrm>
-          <a:prstGeom prst="rect">
-            <a:avLst/>
-          </a:prstGeom>
-        </p:spPr>
-        <p:txBody>
-          <a:bodyPr anchorCtr="0" anchor="t" bIns="91425" lIns="91425" spcFirstLastPara="1" rIns="91425" wrap="square" tIns="91425">
-            <a:noAutofit/>
-          </a:bodyPr>
-          <a:lstStyle/>
-          <a:p>
-            <a:pPr indent="0" lvl="0" marL="0" rtl="0" algn="l">
-              <a:spcBef>
-                <a:spcPts val="0"/>
-              </a:spcBef>
-              <a:spcAft>
-                <a:spcPts val="0"/>
-              </a:spcAft>
-              <a:buNone/>
-            </a:pPr>
-            <a:r>
-              <a:t/>
-            </a:r>
-            <a:endParaRPr/>
-          </a:p>
-        </p:txBody>
-      </p:sp>
-    </p:spTree>
-  </p:cSld>
-  <p:clrMapOvr>
-    <a:masterClrMapping/>
-  </p:clrMapOvr>
-</p:notes>
-</file>
-
-<file path=ppt/notesSlides/notesSlide9.xml><?xml version="1.0" encoding="utf-8"?>
-<p:notes xmlns:a="http://schemas.openxmlformats.org/drawingml/2006/main" xmlns:r="http://schemas.openxmlformats.org/officeDocument/2006/relationships" xmlns:mc="http://schemas.openxmlformats.org/markup-compatibility/2006" xmlns:mv="urn:schemas-microsoft-com:mac:vml" xmlns:p="http://schemas.openxmlformats.org/presentationml/2006/main" xmlns:c="http://schemas.openxmlformats.org/drawingml/2006/chart" xmlns:dgm="http://schemas.openxmlformats.org/drawingml/2006/diagram" xmlns:o="urn:schemas-microsoft-com:office:office" xmlns:v="urn:schemas-microsoft-com:vml" xmlns:pvml="urn:schemas-microsoft-com:office:powerpoint" xmlns:com="http://schemas.openxmlformats.org/drawingml/2006/compatibility" xmlns:p14="http://schemas.microsoft.com/office/powerpoint/2010/main" xmlns:p15="http://schemas.microsoft.com/office/powerpoint/2012/main" xmlns:ahyp="http://schemas.microsoft.com/office/drawing/2018/hyperlinkcolor" showMasterPhAnim="0" showMasterSp="0">
-  <p:cSld>
-    <p:spTree>
-      <p:nvGrpSpPr>
-        <p:cNvPr id="104" name="Shape 104"/>
-        <p:cNvGrpSpPr/>
-        <p:nvPr/>
-      </p:nvGrpSpPr>
-      <p:grpSpPr>
-        <a:xfrm>
-          <a:off x="0" y="0"/>
-          <a:ext cx="0" cy="0"/>
-          <a:chOff x="0" y="0"/>
-          <a:chExt cx="0" cy="0"/>
-        </a:xfrm>
-      </p:grpSpPr>
-      <p:sp>
-        <p:nvSpPr>
-          <p:cNvPr id="105" name="Google Shape;105;gc6f90357f_0_41:notes"/>
-          <p:cNvSpPr/>
-          <p:nvPr>
-            <p:ph idx="2" type="sldImg"/>
-          </p:nvPr>
-        </p:nvSpPr>
-        <p:spPr>
-          <a:xfrm>
-            <a:off x="381188" y="685800"/>
-            <a:ext cx="6096300" cy="3429000"/>
-          </a:xfrm>
-          <a:custGeom>
-            <a:rect b="b" l="l" r="r" t="t"/>
-            <a:pathLst>
-              <a:path extrusionOk="0" h="120000" w="120000">
-                <a:moveTo>
-                  <a:pt x="0" y="0"/>
-                </a:moveTo>
-                <a:lnTo>
-                  <a:pt x="120000" y="0"/>
-                </a:lnTo>
-                <a:lnTo>
-                  <a:pt x="120000" y="120000"/>
-                </a:lnTo>
-                <a:lnTo>
-                  <a:pt x="0" y="120000"/>
-                </a:lnTo>
-                <a:close/>
-              </a:path>
-            </a:pathLst>
-          </a:custGeom>
-        </p:spPr>
-      </p:sp>
-      <p:sp>
-        <p:nvSpPr>
-          <p:cNvPr id="106" name="Google Shape;106;gc6f90357f_0_41:notes"/>
           <p:cNvSpPr txBox="1"/>
           <p:nvPr>
             <p:ph idx="1" type="body"/>
@@ -6502,31 +6302,6 @@
 </p:sld>
 </file>
 
-<file path=ppt/slides/slide10.xml><?xml version="1.0" encoding="utf-8"?>
-<p:sld xmlns:a="http://schemas.openxmlformats.org/drawingml/2006/main" xmlns:r="http://schemas.openxmlformats.org/officeDocument/2006/relationships" xmlns:mc="http://schemas.openxmlformats.org/markup-compatibility/2006" xmlns:mv="urn:schemas-microsoft-com:mac:vml" xmlns:p="http://schemas.openxmlformats.org/presentationml/2006/main" xmlns:c="http://schemas.openxmlformats.org/drawingml/2006/chart" xmlns:dgm="http://schemas.openxmlformats.org/drawingml/2006/diagram" xmlns:o="urn:schemas-microsoft-com:office:office" xmlns:v="urn:schemas-microsoft-com:vml" xmlns:pvml="urn:schemas-microsoft-com:office:powerpoint" xmlns:com="http://schemas.openxmlformats.org/drawingml/2006/compatibility" xmlns:p14="http://schemas.microsoft.com/office/powerpoint/2010/main" xmlns:p15="http://schemas.microsoft.com/office/powerpoint/2012/main" xmlns:ahyp="http://schemas.microsoft.com/office/drawing/2018/hyperlinkcolor">
-  <p:cSld>
-    <p:spTree>
-      <p:nvGrpSpPr>
-        <p:cNvPr id="111" name="Shape 111"/>
-        <p:cNvGrpSpPr/>
-        <p:nvPr/>
-      </p:nvGrpSpPr>
-      <p:grpSpPr>
-        <a:xfrm>
-          <a:off x="0" y="0"/>
-          <a:ext cx="0" cy="0"/>
-          <a:chOff x="0" y="0"/>
-          <a:chExt cx="0" cy="0"/>
-        </a:xfrm>
-      </p:grpSpPr>
-    </p:spTree>
-  </p:cSld>
-  <p:clrMapOvr>
-    <a:masterClrMapping/>
-  </p:clrMapOvr>
-</p:sld>
-</file>
-
 <file path=ppt/slides/slide2.xml><?xml version="1.0" encoding="utf-8"?>
 <p:sld xmlns:a="http://schemas.openxmlformats.org/drawingml/2006/main" xmlns:r="http://schemas.openxmlformats.org/officeDocument/2006/relationships" xmlns:mc="http://schemas.openxmlformats.org/markup-compatibility/2006" xmlns:mv="urn:schemas-microsoft-com:mac:vml" xmlns:p="http://schemas.openxmlformats.org/presentationml/2006/main" xmlns:c="http://schemas.openxmlformats.org/drawingml/2006/chart" xmlns:dgm="http://schemas.openxmlformats.org/drawingml/2006/diagram" xmlns:o="urn:schemas-microsoft-com:office:office" xmlns:v="urn:schemas-microsoft-com:vml" xmlns:pvml="urn:schemas-microsoft-com:office:powerpoint" xmlns:com="http://schemas.openxmlformats.org/drawingml/2006/compatibility" xmlns:p14="http://schemas.microsoft.com/office/powerpoint/2010/main" xmlns:p15="http://schemas.microsoft.com/office/powerpoint/2012/main" xmlns:ahyp="http://schemas.microsoft.com/office/drawing/2018/hyperlinkcolor">
   <p:cSld>
@@ -6692,7 +6467,7 @@
             <a:tbl>
               <a:tblPr>
                 <a:noFill/>
-                <a:tableStyleId>{8E2E0830-1A52-4868-B6C2-A846EC734900}</a:tableStyleId>
+                <a:tableStyleId>{408FCF63-D381-4FC7-9BC9-385E0AE11F51}</a:tableStyleId>
               </a:tblPr>
               <a:tblGrid>
                 <a:gridCol w="3619500"/>
@@ -7800,31 +7575,64 @@
           <a:chExt cx="0" cy="0"/>
         </a:xfrm>
       </p:grpSpPr>
-    </p:spTree>
-  </p:cSld>
-  <p:clrMapOvr>
-    <a:masterClrMapping/>
-  </p:clrMapOvr>
-</p:sld>
-</file>
-
-<file path=ppt/slides/slide9.xml><?xml version="1.0" encoding="utf-8"?>
-<p:sld xmlns:a="http://schemas.openxmlformats.org/drawingml/2006/main" xmlns:r="http://schemas.openxmlformats.org/officeDocument/2006/relationships" xmlns:mc="http://schemas.openxmlformats.org/markup-compatibility/2006" xmlns:mv="urn:schemas-microsoft-com:mac:vml" xmlns:p="http://schemas.openxmlformats.org/presentationml/2006/main" xmlns:c="http://schemas.openxmlformats.org/drawingml/2006/chart" xmlns:dgm="http://schemas.openxmlformats.org/drawingml/2006/diagram" xmlns:o="urn:schemas-microsoft-com:office:office" xmlns:v="urn:schemas-microsoft-com:vml" xmlns:pvml="urn:schemas-microsoft-com:office:powerpoint" xmlns:com="http://schemas.openxmlformats.org/drawingml/2006/compatibility" xmlns:p14="http://schemas.microsoft.com/office/powerpoint/2010/main" xmlns:p15="http://schemas.microsoft.com/office/powerpoint/2012/main" xmlns:ahyp="http://schemas.microsoft.com/office/drawing/2018/hyperlinkcolor">
-  <p:cSld>
-    <p:spTree>
-      <p:nvGrpSpPr>
-        <p:cNvPr id="107" name="Shape 107"/>
-        <p:cNvGrpSpPr/>
-        <p:nvPr/>
-      </p:nvGrpSpPr>
-      <p:grpSpPr>
-        <a:xfrm>
-          <a:off x="0" y="0"/>
-          <a:ext cx="0" cy="0"/>
-          <a:chOff x="0" y="0"/>
-          <a:chExt cx="0" cy="0"/>
-        </a:xfrm>
-      </p:grpSpPr>
+      <p:sp>
+        <p:nvSpPr>
+          <p:cNvPr id="104" name="Google Shape;104;p20"/>
+          <p:cNvSpPr txBox="1"/>
+          <p:nvPr/>
+        </p:nvSpPr>
+        <p:spPr>
+          <a:xfrm>
+            <a:off x="5946400" y="4302975"/>
+            <a:ext cx="3111300" cy="740100"/>
+          </a:xfrm>
+          <a:prstGeom prst="rect">
+            <a:avLst/>
+          </a:prstGeom>
+          <a:noFill/>
+          <a:ln>
+            <a:noFill/>
+          </a:ln>
+        </p:spPr>
+        <p:txBody>
+          <a:bodyPr anchorCtr="0" anchor="t" bIns="91425" lIns="91425" spcFirstLastPara="1" rIns="91425" wrap="square" tIns="91425">
+            <a:noAutofit/>
+          </a:bodyPr>
+          <a:lstStyle/>
+          <a:p>
+            <a:pPr indent="0" lvl="0" marL="0" rtl="0" algn="l">
+              <a:spcBef>
+                <a:spcPts val="0"/>
+              </a:spcBef>
+              <a:spcAft>
+                <a:spcPts val="0"/>
+              </a:spcAft>
+              <a:buNone/>
+            </a:pPr>
+            <a:r>
+              <a:rPr lang="es-419" sz="1800">
+                <a:solidFill>
+                  <a:schemeClr val="lt2"/>
+                </a:solidFill>
+              </a:rPr>
+              <a:t>Continuamos con el desarrollo en el </a:t>
+            </a:r>
+            <a:r>
+              <a:rPr lang="es-419" sz="1800">
+                <a:solidFill>
+                  <a:schemeClr val="lt2"/>
+                </a:solidFill>
+              </a:rPr>
+              <a:t>código</a:t>
+            </a:r>
+            <a:endParaRPr sz="1800">
+              <a:solidFill>
+                <a:schemeClr val="lt2"/>
+              </a:solidFill>
+            </a:endParaRPr>
+          </a:p>
+        </p:txBody>
+      </p:sp>
     </p:spTree>
   </p:cSld>
   <p:clrMapOvr>
@@ -7834,6 +7642,285 @@
 </file>
 
 <file path=ppt/theme/theme1.xml><?xml version="1.0" encoding="utf-8"?>
+<a:theme xmlns:a="http://schemas.openxmlformats.org/drawingml/2006/main" xmlns:r="http://schemas.openxmlformats.org/officeDocument/2006/relationships">
+  <a:themeElements>
+    <a:clrScheme name="Default">
+      <a:dk1>
+        <a:srgbClr val="000000"/>
+      </a:dk1>
+      <a:lt1>
+        <a:srgbClr val="FFFFFF"/>
+      </a:lt1>
+      <a:dk2>
+        <a:srgbClr val="158158"/>
+      </a:dk2>
+      <a:lt2>
+        <a:srgbClr val="F3F3F3"/>
+      </a:lt2>
+      <a:accent1>
+        <a:srgbClr val="058DC7"/>
+      </a:accent1>
+      <a:accent2>
+        <a:srgbClr val="50B432"/>
+      </a:accent2>
+      <a:accent3>
+        <a:srgbClr val="ED561B"/>
+      </a:accent3>
+      <a:accent4>
+        <a:srgbClr val="EDEF00"/>
+      </a:accent4>
+      <a:accent5>
+        <a:srgbClr val="24CBE5"/>
+      </a:accent5>
+      <a:accent6>
+        <a:srgbClr val="64E572"/>
+      </a:accent6>
+      <a:hlink>
+        <a:srgbClr val="2200CC"/>
+      </a:hlink>
+      <a:folHlink>
+        <a:srgbClr val="551A8B"/>
+      </a:folHlink>
+    </a:clrScheme>
+    <a:fontScheme name="Office">
+      <a:majorFont>
+        <a:latin typeface="Arial"/>
+        <a:ea typeface=""/>
+        <a:cs typeface=""/>
+        <a:font script="Jpan" typeface="ＭＳ Ｐゴシック"/>
+        <a:font script="Hang" typeface="맑은 고딕"/>
+        <a:font script="Hans" typeface="宋体"/>
+        <a:font script="Hant" typeface="新細明體"/>
+        <a:font script="Arab" typeface="Times New Roman"/>
+        <a:font script="Hebr" typeface="Times New Roman"/>
+        <a:font script="Thai" typeface="Angsana New"/>
+        <a:font script="Ethi" typeface="Nyala"/>
+        <a:font script="Beng" typeface="Vrinda"/>
+        <a:font script="Gujr" typeface="Shruti"/>
+        <a:font script="Khmr" typeface="MoolBoran"/>
+        <a:font script="Knda" typeface="Tunga"/>
+        <a:font script="Guru" typeface="Raavi"/>
+        <a:font script="Cans" typeface="Euphemia"/>
+        <a:font script="Cher" typeface="Plantagenet Cherokee"/>
+        <a:font script="Yiii" typeface="Microsoft Yi Baiti"/>
+        <a:font script="Tibt" typeface="Microsoft Himalaya"/>
+        <a:font script="Thaa" typeface="MV Boli"/>
+        <a:font script="Deva" typeface="Mangal"/>
+        <a:font script="Telu" typeface="Gautami"/>
+        <a:font script="Taml" typeface="Latha"/>
+        <a:font script="Syrc" typeface="Estrangelo Edessa"/>
+        <a:font script="Orya" typeface="Kalinga"/>
+        <a:font script="Mlym" typeface="Kartika"/>
+        <a:font script="Laoo" typeface="DokChampa"/>
+        <a:font script="Sinh" typeface="Iskoola Pota"/>
+        <a:font script="Mong" typeface="Mongolian Baiti"/>
+        <a:font script="Viet" typeface="Times New Roman"/>
+        <a:font script="Uigh" typeface="Microsoft Uighur"/>
+        <a:font script="Geor" typeface="Sylfaen"/>
+      </a:majorFont>
+      <a:minorFont>
+        <a:latin typeface="Arial"/>
+        <a:ea typeface=""/>
+        <a:cs typeface=""/>
+        <a:font script="Jpan" typeface="ＭＳ Ｐゴシック"/>
+        <a:font script="Hang" typeface="맑은 고딕"/>
+        <a:font script="Hans" typeface="宋体"/>
+        <a:font script="Hant" typeface="新細明體"/>
+        <a:font script="Arab" typeface="Arial"/>
+        <a:font script="Hebr" typeface="Arial"/>
+        <a:font script="Thai" typeface="Cordia New"/>
+        <a:font script="Ethi" typeface="Nyala"/>
+        <a:font script="Beng" typeface="Vrinda"/>
+        <a:font script="Gujr" typeface="Shruti"/>
+        <a:font script="Khmr" typeface="DaunPenh"/>
+        <a:font script="Knda" typeface="Tunga"/>
+        <a:font script="Guru" typeface="Raavi"/>
+        <a:font script="Cans" typeface="Euphemia"/>
+        <a:font script="Cher" typeface="Plantagenet Cherokee"/>
+        <a:font script="Yiii" typeface="Microsoft Yi Baiti"/>
+        <a:font script="Tibt" typeface="Microsoft Himalaya"/>
+        <a:font script="Thaa" typeface="MV Boli"/>
+        <a:font script="Deva" typeface="Mangal"/>
+        <a:font script="Telu" typeface="Gautami"/>
+        <a:font script="Taml" typeface="Latha"/>
+        <a:font script="Syrc" typeface="Estrangelo Edessa"/>
+        <a:font script="Orya" typeface="Kalinga"/>
+        <a:font script="Mlym" typeface="Kartika"/>
+        <a:font script="Laoo" typeface="DokChampa"/>
+        <a:font script="Sinh" typeface="Iskoola Pota"/>
+        <a:font script="Mong" typeface="Mongolian Baiti"/>
+        <a:font script="Viet" typeface="Arial"/>
+        <a:font script="Uigh" typeface="Microsoft Uighur"/>
+        <a:font script="Geor" typeface="Sylfaen"/>
+      </a:minorFont>
+    </a:fontScheme>
+    <a:fmtScheme name="Office">
+      <a:fillStyleLst>
+        <a:solidFill>
+          <a:schemeClr val="phClr"/>
+        </a:solidFill>
+        <a:gradFill rotWithShape="1">
+          <a:gsLst>
+            <a:gs pos="0">
+              <a:schemeClr val="phClr">
+                <a:tint val="50000"/>
+                <a:satMod val="300000"/>
+              </a:schemeClr>
+            </a:gs>
+            <a:gs pos="35000">
+              <a:schemeClr val="phClr">
+                <a:tint val="37000"/>
+                <a:satMod val="300000"/>
+              </a:schemeClr>
+            </a:gs>
+            <a:gs pos="100000">
+              <a:schemeClr val="phClr">
+                <a:tint val="15000"/>
+                <a:satMod val="350000"/>
+              </a:schemeClr>
+            </a:gs>
+          </a:gsLst>
+          <a:lin ang="16200000" scaled="1"/>
+        </a:gradFill>
+        <a:gradFill rotWithShape="1">
+          <a:gsLst>
+            <a:gs pos="0">
+              <a:schemeClr val="phClr">
+                <a:tint val="100000"/>
+                <a:shade val="100000"/>
+                <a:satMod val="130000"/>
+              </a:schemeClr>
+            </a:gs>
+            <a:gs pos="100000">
+              <a:schemeClr val="phClr">
+                <a:tint val="50000"/>
+                <a:shade val="100000"/>
+                <a:satMod val="350000"/>
+              </a:schemeClr>
+            </a:gs>
+          </a:gsLst>
+          <a:lin ang="16200000" scaled="0"/>
+        </a:gradFill>
+      </a:fillStyleLst>
+      <a:lnStyleLst>
+        <a:ln w="9525" cap="flat" cmpd="sng" algn="ctr">
+          <a:solidFill>
+            <a:schemeClr val="phClr">
+              <a:shade val="95000"/>
+              <a:satMod val="105000"/>
+            </a:schemeClr>
+          </a:solidFill>
+          <a:prstDash val="solid"/>
+        </a:ln>
+        <a:ln w="25400" cap="flat" cmpd="sng" algn="ctr">
+          <a:solidFill>
+            <a:schemeClr val="phClr"/>
+          </a:solidFill>
+          <a:prstDash val="solid"/>
+        </a:ln>
+        <a:ln w="38100" cap="flat" cmpd="sng" algn="ctr">
+          <a:solidFill>
+            <a:schemeClr val="phClr"/>
+          </a:solidFill>
+          <a:prstDash val="solid"/>
+        </a:ln>
+      </a:lnStyleLst>
+      <a:effectStyleLst>
+        <a:effectStyle>
+          <a:effectLst>
+            <a:outerShdw blurRad="40000" dist="20000" dir="5400000" rotWithShape="0">
+              <a:srgbClr val="000000">
+                <a:alpha val="38000"/>
+              </a:srgbClr>
+            </a:outerShdw>
+          </a:effectLst>
+        </a:effectStyle>
+        <a:effectStyle>
+          <a:effectLst>
+            <a:outerShdw blurRad="40000" dist="23000" dir="5400000" rotWithShape="0">
+              <a:srgbClr val="000000">
+                <a:alpha val="35000"/>
+              </a:srgbClr>
+            </a:outerShdw>
+          </a:effectLst>
+        </a:effectStyle>
+        <a:effectStyle>
+          <a:effectLst>
+            <a:outerShdw blurRad="40000" dist="23000" dir="5400000" rotWithShape="0">
+              <a:srgbClr val="000000">
+                <a:alpha val="35000"/>
+              </a:srgbClr>
+            </a:outerShdw>
+          </a:effectLst>
+          <a:scene3d>
+            <a:camera prst="orthographicFront">
+              <a:rot lat="0" lon="0" rev="0"/>
+            </a:camera>
+            <a:lightRig rig="threePt" dir="t">
+              <a:rot lat="0" lon="0" rev="1200000"/>
+            </a:lightRig>
+          </a:scene3d>
+          <a:sp3d>
+            <a:bevelT w="63500" h="25400"/>
+          </a:sp3d>
+        </a:effectStyle>
+      </a:effectStyleLst>
+      <a:bgFillStyleLst>
+        <a:solidFill>
+          <a:schemeClr val="phClr"/>
+        </a:solidFill>
+        <a:gradFill rotWithShape="1">
+          <a:gsLst>
+            <a:gs pos="0">
+              <a:schemeClr val="phClr">
+                <a:tint val="40000"/>
+                <a:satMod val="350000"/>
+              </a:schemeClr>
+            </a:gs>
+            <a:gs pos="40000">
+              <a:schemeClr val="phClr">
+                <a:tint val="45000"/>
+                <a:shade val="99000"/>
+                <a:satMod val="350000"/>
+              </a:schemeClr>
+            </a:gs>
+            <a:gs pos="100000">
+              <a:schemeClr val="phClr">
+                <a:shade val="20000"/>
+                <a:satMod val="255000"/>
+              </a:schemeClr>
+            </a:gs>
+          </a:gsLst>
+          <a:path path="circle">
+            <a:fillToRect l="50000" t="-80000" r="50000" b="180000"/>
+          </a:path>
+        </a:gradFill>
+        <a:gradFill rotWithShape="1">
+          <a:gsLst>
+            <a:gs pos="0">
+              <a:schemeClr val="phClr">
+                <a:tint val="80000"/>
+                <a:satMod val="300000"/>
+              </a:schemeClr>
+            </a:gs>
+            <a:gs pos="100000">
+              <a:schemeClr val="phClr">
+                <a:shade val="30000"/>
+                <a:satMod val="200000"/>
+              </a:schemeClr>
+            </a:gs>
+          </a:gsLst>
+          <a:path path="circle">
+            <a:fillToRect l="50000" t="50000" r="50000" b="50000"/>
+          </a:path>
+        </a:gradFill>
+      </a:bgFillStyleLst>
+    </a:fmtScheme>
+  </a:themeElements>
+</a:theme>
+</file>
+
+<file path=ppt/theme/theme2.xml><?xml version="1.0" encoding="utf-8"?>
 <a:theme xmlns:a="http://schemas.openxmlformats.org/drawingml/2006/main" xmlns:r="http://schemas.openxmlformats.org/officeDocument/2006/relationships" name="Simple Dark">
   <a:themeElements>
     <a:clrScheme name="Simple Dark">
@@ -8110,283 +8197,4 @@
     </a:fmtScheme>
   </a:themeElements>
 </a:theme>
-</file>
-
-<file path=ppt/theme/theme2.xml><?xml version="1.0" encoding="utf-8"?>
-<a:theme xmlns:a="http://schemas.openxmlformats.org/drawingml/2006/main" xmlns:r="http://schemas.openxmlformats.org/officeDocument/2006/relationships">
-  <a:themeElements>
-    <a:clrScheme name="Default">
-      <a:dk1>
-        <a:srgbClr val="000000"/>
-      </a:dk1>
-      <a:lt1>
-        <a:srgbClr val="FFFFFF"/>
-      </a:lt1>
-      <a:dk2>
-        <a:srgbClr val="158158"/>
-      </a:dk2>
-      <a:lt2>
-        <a:srgbClr val="F3F3F3"/>
-      </a:lt2>
-      <a:accent1>
-        <a:srgbClr val="058DC7"/>
-      </a:accent1>
-      <a:accent2>
-        <a:srgbClr val="50B432"/>
-      </a:accent2>
-      <a:accent3>
-        <a:srgbClr val="ED561B"/>
-      </a:accent3>
-      <a:accent4>
-        <a:srgbClr val="EDEF00"/>
-      </a:accent4>
-      <a:accent5>
-        <a:srgbClr val="24CBE5"/>
-      </a:accent5>
-      <a:accent6>
-        <a:srgbClr val="64E572"/>
-      </a:accent6>
-      <a:hlink>
-        <a:srgbClr val="2200CC"/>
-      </a:hlink>
-      <a:folHlink>
-        <a:srgbClr val="551A8B"/>
-      </a:folHlink>
-    </a:clrScheme>
-    <a:fontScheme name="Office">
-      <a:majorFont>
-        <a:latin typeface="Arial"/>
-        <a:ea typeface=""/>
-        <a:cs typeface=""/>
-        <a:font script="Jpan" typeface="ＭＳ Ｐゴシック"/>
-        <a:font script="Hang" typeface="맑은 고딕"/>
-        <a:font script="Hans" typeface="宋体"/>
-        <a:font script="Hant" typeface="新細明體"/>
-        <a:font script="Arab" typeface="Times New Roman"/>
-        <a:font script="Hebr" typeface="Times New Roman"/>
-        <a:font script="Thai" typeface="Angsana New"/>
-        <a:font script="Ethi" typeface="Nyala"/>
-        <a:font script="Beng" typeface="Vrinda"/>
-        <a:font script="Gujr" typeface="Shruti"/>
-        <a:font script="Khmr" typeface="MoolBoran"/>
-        <a:font script="Knda" typeface="Tunga"/>
-        <a:font script="Guru" typeface="Raavi"/>
-        <a:font script="Cans" typeface="Euphemia"/>
-        <a:font script="Cher" typeface="Plantagenet Cherokee"/>
-        <a:font script="Yiii" typeface="Microsoft Yi Baiti"/>
-        <a:font script="Tibt" typeface="Microsoft Himalaya"/>
-        <a:font script="Thaa" typeface="MV Boli"/>
-        <a:font script="Deva" typeface="Mangal"/>
-        <a:font script="Telu" typeface="Gautami"/>
-        <a:font script="Taml" typeface="Latha"/>
-        <a:font script="Syrc" typeface="Estrangelo Edessa"/>
-        <a:font script="Orya" typeface="Kalinga"/>
-        <a:font script="Mlym" typeface="Kartika"/>
-        <a:font script="Laoo" typeface="DokChampa"/>
-        <a:font script="Sinh" typeface="Iskoola Pota"/>
-        <a:font script="Mong" typeface="Mongolian Baiti"/>
-        <a:font script="Viet" typeface="Times New Roman"/>
-        <a:font script="Uigh" typeface="Microsoft Uighur"/>
-        <a:font script="Geor" typeface="Sylfaen"/>
-      </a:majorFont>
-      <a:minorFont>
-        <a:latin typeface="Arial"/>
-        <a:ea typeface=""/>
-        <a:cs typeface=""/>
-        <a:font script="Jpan" typeface="ＭＳ Ｐゴシック"/>
-        <a:font script="Hang" typeface="맑은 고딕"/>
-        <a:font script="Hans" typeface="宋体"/>
-        <a:font script="Hant" typeface="新細明體"/>
-        <a:font script="Arab" typeface="Arial"/>
-        <a:font script="Hebr" typeface="Arial"/>
-        <a:font script="Thai" typeface="Cordia New"/>
-        <a:font script="Ethi" typeface="Nyala"/>
-        <a:font script="Beng" typeface="Vrinda"/>
-        <a:font script="Gujr" typeface="Shruti"/>
-        <a:font script="Khmr" typeface="DaunPenh"/>
-        <a:font script="Knda" typeface="Tunga"/>
-        <a:font script="Guru" typeface="Raavi"/>
-        <a:font script="Cans" typeface="Euphemia"/>
-        <a:font script="Cher" typeface="Plantagenet Cherokee"/>
-        <a:font script="Yiii" typeface="Microsoft Yi Baiti"/>
-        <a:font script="Tibt" typeface="Microsoft Himalaya"/>
-        <a:font script="Thaa" typeface="MV Boli"/>
-        <a:font script="Deva" typeface="Mangal"/>
-        <a:font script="Telu" typeface="Gautami"/>
-        <a:font script="Taml" typeface="Latha"/>
-        <a:font script="Syrc" typeface="Estrangelo Edessa"/>
-        <a:font script="Orya" typeface="Kalinga"/>
-        <a:font script="Mlym" typeface="Kartika"/>
-        <a:font script="Laoo" typeface="DokChampa"/>
-        <a:font script="Sinh" typeface="Iskoola Pota"/>
-        <a:font script="Mong" typeface="Mongolian Baiti"/>
-        <a:font script="Viet" typeface="Arial"/>
-        <a:font script="Uigh" typeface="Microsoft Uighur"/>
-        <a:font script="Geor" typeface="Sylfaen"/>
-      </a:minorFont>
-    </a:fontScheme>
-    <a:fmtScheme name="Office">
-      <a:fillStyleLst>
-        <a:solidFill>
-          <a:schemeClr val="phClr"/>
-        </a:solidFill>
-        <a:gradFill rotWithShape="1">
-          <a:gsLst>
-            <a:gs pos="0">
-              <a:schemeClr val="phClr">
-                <a:tint val="50000"/>
-                <a:satMod val="300000"/>
-              </a:schemeClr>
-            </a:gs>
-            <a:gs pos="35000">
-              <a:schemeClr val="phClr">
-                <a:tint val="37000"/>
-                <a:satMod val="300000"/>
-              </a:schemeClr>
-            </a:gs>
-            <a:gs pos="100000">
-              <a:schemeClr val="phClr">
-                <a:tint val="15000"/>
-                <a:satMod val="350000"/>
-              </a:schemeClr>
-            </a:gs>
-          </a:gsLst>
-          <a:lin ang="16200000" scaled="1"/>
-        </a:gradFill>
-        <a:gradFill rotWithShape="1">
-          <a:gsLst>
-            <a:gs pos="0">
-              <a:schemeClr val="phClr">
-                <a:tint val="100000"/>
-                <a:shade val="100000"/>
-                <a:satMod val="130000"/>
-              </a:schemeClr>
-            </a:gs>
-            <a:gs pos="100000">
-              <a:schemeClr val="phClr">
-                <a:tint val="50000"/>
-                <a:shade val="100000"/>
-                <a:satMod val="350000"/>
-              </a:schemeClr>
-            </a:gs>
-          </a:gsLst>
-          <a:lin ang="16200000" scaled="0"/>
-        </a:gradFill>
-      </a:fillStyleLst>
-      <a:lnStyleLst>
-        <a:ln w="9525" cap="flat" cmpd="sng" algn="ctr">
-          <a:solidFill>
-            <a:schemeClr val="phClr">
-              <a:shade val="95000"/>
-              <a:satMod val="105000"/>
-            </a:schemeClr>
-          </a:solidFill>
-          <a:prstDash val="solid"/>
-        </a:ln>
-        <a:ln w="25400" cap="flat" cmpd="sng" algn="ctr">
-          <a:solidFill>
-            <a:schemeClr val="phClr"/>
-          </a:solidFill>
-          <a:prstDash val="solid"/>
-        </a:ln>
-        <a:ln w="38100" cap="flat" cmpd="sng" algn="ctr">
-          <a:solidFill>
-            <a:schemeClr val="phClr"/>
-          </a:solidFill>
-          <a:prstDash val="solid"/>
-        </a:ln>
-      </a:lnStyleLst>
-      <a:effectStyleLst>
-        <a:effectStyle>
-          <a:effectLst>
-            <a:outerShdw blurRad="40000" dist="20000" dir="5400000" rotWithShape="0">
-              <a:srgbClr val="000000">
-                <a:alpha val="38000"/>
-              </a:srgbClr>
-            </a:outerShdw>
-          </a:effectLst>
-        </a:effectStyle>
-        <a:effectStyle>
-          <a:effectLst>
-            <a:outerShdw blurRad="40000" dist="23000" dir="5400000" rotWithShape="0">
-              <a:srgbClr val="000000">
-                <a:alpha val="35000"/>
-              </a:srgbClr>
-            </a:outerShdw>
-          </a:effectLst>
-        </a:effectStyle>
-        <a:effectStyle>
-          <a:effectLst>
-            <a:outerShdw blurRad="40000" dist="23000" dir="5400000" rotWithShape="0">
-              <a:srgbClr val="000000">
-                <a:alpha val="35000"/>
-              </a:srgbClr>
-            </a:outerShdw>
-          </a:effectLst>
-          <a:scene3d>
-            <a:camera prst="orthographicFront">
-              <a:rot lat="0" lon="0" rev="0"/>
-            </a:camera>
-            <a:lightRig rig="threePt" dir="t">
-              <a:rot lat="0" lon="0" rev="1200000"/>
-            </a:lightRig>
-          </a:scene3d>
-          <a:sp3d>
-            <a:bevelT w="63500" h="25400"/>
-          </a:sp3d>
-        </a:effectStyle>
-      </a:effectStyleLst>
-      <a:bgFillStyleLst>
-        <a:solidFill>
-          <a:schemeClr val="phClr"/>
-        </a:solidFill>
-        <a:gradFill rotWithShape="1">
-          <a:gsLst>
-            <a:gs pos="0">
-              <a:schemeClr val="phClr">
-                <a:tint val="40000"/>
-                <a:satMod val="350000"/>
-              </a:schemeClr>
-            </a:gs>
-            <a:gs pos="40000">
-              <a:schemeClr val="phClr">
-                <a:tint val="45000"/>
-                <a:shade val="99000"/>
-                <a:satMod val="350000"/>
-              </a:schemeClr>
-            </a:gs>
-            <a:gs pos="100000">
-              <a:schemeClr val="phClr">
-                <a:shade val="20000"/>
-                <a:satMod val="255000"/>
-              </a:schemeClr>
-            </a:gs>
-          </a:gsLst>
-          <a:path path="circle">
-            <a:fillToRect l="50000" t="-80000" r="50000" b="180000"/>
-          </a:path>
-        </a:gradFill>
-        <a:gradFill rotWithShape="1">
-          <a:gsLst>
-            <a:gs pos="0">
-              <a:schemeClr val="phClr">
-                <a:tint val="80000"/>
-                <a:satMod val="300000"/>
-              </a:schemeClr>
-            </a:gs>
-            <a:gs pos="100000">
-              <a:schemeClr val="phClr">
-                <a:shade val="30000"/>
-                <a:satMod val="200000"/>
-              </a:schemeClr>
-            </a:gs>
-          </a:gsLst>
-          <a:path path="circle">
-            <a:fillToRect l="50000" t="50000" r="50000" b="50000"/>
-          </a:path>
-        </a:gradFill>
-      </a:bgFillStyleLst>
-    </a:fmtScheme>
-  </a:themeElements>
-</a:theme>
 </file>
</xml_diff>